<commit_message>
Presentación, código y archivos del segundo meetup - Manejo inicial de datos
</commit_message>
<xml_diff>
--- a/Meetup/Primer meetup R-Ladies Santiago SEPTIEMBRE/1. RLadiesSantiago.pptx
+++ b/Meetup/Primer meetup R-Ladies Santiago SEPTIEMBRE/1. RLadiesSantiago.pptx
@@ -219,7 +219,7 @@
           <a:p>
             <a:fld id="{8BDD0CFA-8480-4D90-8A03-8DD644129E6D}" type="datetimeFigureOut">
               <a:rPr lang="es-EC" smtClean="0"/>
-              <a:t>27/09/2017</a:t>
+              <a:t>24/10/2017</a:t>
             </a:fld>
             <a:endParaRPr lang="es-EC"/>
           </a:p>
@@ -2208,7 +2208,7 @@
           <a:p>
             <a:fld id="{DD7D4C3D-6345-4F11-9249-6ABD2919FA88}" type="datetimeFigureOut">
               <a:rPr lang="es-EC" smtClean="0"/>
-              <a:t>27/09/2017</a:t>
+              <a:t>24/10/2017</a:t>
             </a:fld>
             <a:endParaRPr lang="es-EC"/>
           </a:p>
@@ -2378,7 +2378,7 @@
           <a:p>
             <a:fld id="{DD7D4C3D-6345-4F11-9249-6ABD2919FA88}" type="datetimeFigureOut">
               <a:rPr lang="es-EC" smtClean="0"/>
-              <a:t>27/09/2017</a:t>
+              <a:t>24/10/2017</a:t>
             </a:fld>
             <a:endParaRPr lang="es-EC"/>
           </a:p>
@@ -2558,7 +2558,7 @@
           <a:p>
             <a:fld id="{DD7D4C3D-6345-4F11-9249-6ABD2919FA88}" type="datetimeFigureOut">
               <a:rPr lang="es-EC" smtClean="0"/>
-              <a:t>27/09/2017</a:t>
+              <a:t>24/10/2017</a:t>
             </a:fld>
             <a:endParaRPr lang="es-EC"/>
           </a:p>
@@ -5277,7 +5277,7 @@
           <a:p>
             <a:fld id="{DD7D4C3D-6345-4F11-9249-6ABD2919FA88}" type="datetimeFigureOut">
               <a:rPr lang="es-EC" smtClean="0"/>
-              <a:t>27/09/2017</a:t>
+              <a:t>24/10/2017</a:t>
             </a:fld>
             <a:endParaRPr lang="es-EC"/>
           </a:p>
@@ -5523,7 +5523,7 @@
           <a:p>
             <a:fld id="{DD7D4C3D-6345-4F11-9249-6ABD2919FA88}" type="datetimeFigureOut">
               <a:rPr lang="es-EC" smtClean="0"/>
-              <a:t>27/09/2017</a:t>
+              <a:t>24/10/2017</a:t>
             </a:fld>
             <a:endParaRPr lang="es-EC"/>
           </a:p>
@@ -5755,7 +5755,7 @@
           <a:p>
             <a:fld id="{DD7D4C3D-6345-4F11-9249-6ABD2919FA88}" type="datetimeFigureOut">
               <a:rPr lang="es-EC" smtClean="0"/>
-              <a:t>27/09/2017</a:t>
+              <a:t>24/10/2017</a:t>
             </a:fld>
             <a:endParaRPr lang="es-EC"/>
           </a:p>
@@ -6122,7 +6122,7 @@
           <a:p>
             <a:fld id="{DD7D4C3D-6345-4F11-9249-6ABD2919FA88}" type="datetimeFigureOut">
               <a:rPr lang="es-EC" smtClean="0"/>
-              <a:t>27/09/2017</a:t>
+              <a:t>24/10/2017</a:t>
             </a:fld>
             <a:endParaRPr lang="es-EC"/>
           </a:p>
@@ -6240,7 +6240,7 @@
           <a:p>
             <a:fld id="{DD7D4C3D-6345-4F11-9249-6ABD2919FA88}" type="datetimeFigureOut">
               <a:rPr lang="es-EC" smtClean="0"/>
-              <a:t>27/09/2017</a:t>
+              <a:t>24/10/2017</a:t>
             </a:fld>
             <a:endParaRPr lang="es-EC"/>
           </a:p>
@@ -6335,7 +6335,7 @@
           <a:p>
             <a:fld id="{DD7D4C3D-6345-4F11-9249-6ABD2919FA88}" type="datetimeFigureOut">
               <a:rPr lang="es-EC" smtClean="0"/>
-              <a:t>27/09/2017</a:t>
+              <a:t>24/10/2017</a:t>
             </a:fld>
             <a:endParaRPr lang="es-EC"/>
           </a:p>
@@ -6612,7 +6612,7 @@
           <a:p>
             <a:fld id="{DD7D4C3D-6345-4F11-9249-6ABD2919FA88}" type="datetimeFigureOut">
               <a:rPr lang="es-EC" smtClean="0"/>
-              <a:t>27/09/2017</a:t>
+              <a:t>24/10/2017</a:t>
             </a:fld>
             <a:endParaRPr lang="es-EC"/>
           </a:p>
@@ -6865,7 +6865,7 @@
           <a:p>
             <a:fld id="{DD7D4C3D-6345-4F11-9249-6ABD2919FA88}" type="datetimeFigureOut">
               <a:rPr lang="es-EC" smtClean="0"/>
-              <a:t>27/09/2017</a:t>
+              <a:t>24/10/2017</a:t>
             </a:fld>
             <a:endParaRPr lang="es-EC"/>
           </a:p>
@@ -7078,7 +7078,7 @@
           <a:p>
             <a:fld id="{DD7D4C3D-6345-4F11-9249-6ABD2919FA88}" type="datetimeFigureOut">
               <a:rPr lang="es-EC" smtClean="0"/>
-              <a:t>27/09/2017</a:t>
+              <a:t>24/10/2017</a:t>
             </a:fld>
             <a:endParaRPr lang="es-EC"/>
           </a:p>
@@ -9840,7 +9840,7 @@
         </p:blipFill>
         <p:spPr bwMode="auto">
           <a:xfrm>
-            <a:off x="7939315" y="1639413"/>
+            <a:off x="7939315" y="1666307"/>
             <a:ext cx="3207660" cy="3477289"/>
           </a:xfrm>
           <a:prstGeom prst="rect">
@@ -10210,7 +10210,31 @@
                 <a:cs typeface="Helvetica Neue"/>
                 <a:sym typeface="Helvetica Neue"/>
               </a:rPr>
-              <a:t>Participa en Slack y el Gituhub</a:t>
+              <a:t>Participa en Slack y </a:t>
+            </a:r>
+            <a:r>
+              <a:rPr lang="en" sz="2400" dirty="0" smtClean="0">
+                <a:solidFill>
+                  <a:srgbClr val="88398A"/>
+                </a:solidFill>
+                <a:latin typeface="Helvetica Neue"/>
+                <a:ea typeface="Helvetica Neue"/>
+                <a:cs typeface="Helvetica Neue"/>
+                <a:sym typeface="Helvetica Neue"/>
+              </a:rPr>
+              <a:t>en </a:t>
+            </a:r>
+            <a:r>
+              <a:rPr lang="en" sz="2400" dirty="0">
+                <a:solidFill>
+                  <a:srgbClr val="88398A"/>
+                </a:solidFill>
+                <a:latin typeface="Helvetica Neue"/>
+                <a:ea typeface="Helvetica Neue"/>
+                <a:cs typeface="Helvetica Neue"/>
+                <a:sym typeface="Helvetica Neue"/>
+              </a:rPr>
+              <a:t>Gituhub</a:t>
             </a:r>
           </a:p>
           <a:p>
@@ -10853,8 +10877,23 @@
                 </a:solidFill>
                 <a:hlinkClick r:id="rId8"/>
               </a:rPr>
-              <a:t>https://github.com/rladies-chicago</a:t>
-            </a:r>
+              <a:t>https://</a:t>
+            </a:r>
+            <a:r>
+              <a:rPr lang="en" u="sng" dirty="0" smtClean="0">
+                <a:solidFill>
+                  <a:schemeClr val="hlink"/>
+                </a:solidFill>
+                <a:hlinkClick r:id="rId8"/>
+              </a:rPr>
+              <a:t>github.com/rladies-santiago</a:t>
+            </a:r>
+            <a:endParaRPr lang="en" u="sng" dirty="0">
+              <a:solidFill>
+                <a:schemeClr val="hlink"/>
+              </a:solidFill>
+              <a:hlinkClick r:id="rId8"/>
+            </a:endParaRPr>
           </a:p>
           <a:p>
             <a:pPr marL="1219170" lvl="1" indent="-304792">
@@ -11458,7 +11497,7 @@
         </p:nvSpPr>
         <p:spPr>
           <a:xfrm>
-            <a:off x="1203400" y="1619233"/>
+            <a:off x="1364765" y="1543313"/>
             <a:ext cx="6184400" cy="1546400"/>
           </a:xfrm>
           <a:prstGeom prst="rect">

</xml_diff>